<commit_message>
Agregado primera parte de catalogo.php, con conexión a la base de datos y consulta de productos.
</commit_message>
<xml_diff>
--- a/AV Clean.pptx
+++ b/AV Clean.pptx
@@ -9,10 +9,13 @@
     <p:sldId id="258" r:id="rId3"/>
     <p:sldId id="257" r:id="rId4"/>
     <p:sldId id="259" r:id="rId5"/>
-    <p:sldId id="260" r:id="rId6"/>
-    <p:sldId id="261" r:id="rId7"/>
-    <p:sldId id="262" r:id="rId8"/>
-    <p:sldId id="263" r:id="rId9"/>
+    <p:sldId id="264" r:id="rId6"/>
+    <p:sldId id="265" r:id="rId7"/>
+    <p:sldId id="260" r:id="rId8"/>
+    <p:sldId id="261" r:id="rId9"/>
+    <p:sldId id="262" r:id="rId10"/>
+    <p:sldId id="263" r:id="rId11"/>
+    <p:sldId id="266" r:id="rId12"/>
   </p:sldIdLst>
   <p:sldSz cx="12192000" cy="6858000"/>
   <p:notesSz cx="6858000" cy="9144000"/>
@@ -111,6 +114,11 @@
       </a:defRPr>
     </a:lvl9pPr>
   </p:defaultTextStyle>
+  <p:extLst>
+    <p:ext uri="{EFAFB233-063F-42B5-8137-9DF3F51BA10A}">
+      <p15:sldGuideLst xmlns:p15="http://schemas.microsoft.com/office/powerpoint/2012/main"/>
+    </p:ext>
+  </p:extLst>
 </p:presentation>
 </file>
 
@@ -12455,7 +12463,7 @@
           <a:p>
             <a:fld id="{1D45F402-2F27-478B-9A76-0BF697F18DB8}" type="datetimeFigureOut">
               <a:rPr lang="es-MX" smtClean="0"/>
-              <a:t>09/02/2026</a:t>
+              <a:t>16/02/2026</a:t>
             </a:fld>
             <a:endParaRPr lang="es-MX"/>
           </a:p>
@@ -12653,7 +12661,7 @@
           <a:p>
             <a:fld id="{1D45F402-2F27-478B-9A76-0BF697F18DB8}" type="datetimeFigureOut">
               <a:rPr lang="es-MX" smtClean="0"/>
-              <a:t>09/02/2026</a:t>
+              <a:t>16/02/2026</a:t>
             </a:fld>
             <a:endParaRPr lang="es-MX"/>
           </a:p>
@@ -12861,7 +12869,7 @@
           <a:p>
             <a:fld id="{1D45F402-2F27-478B-9A76-0BF697F18DB8}" type="datetimeFigureOut">
               <a:rPr lang="es-MX" smtClean="0"/>
-              <a:t>09/02/2026</a:t>
+              <a:t>16/02/2026</a:t>
             </a:fld>
             <a:endParaRPr lang="es-MX"/>
           </a:p>
@@ -13059,7 +13067,7 @@
           <a:p>
             <a:fld id="{1D45F402-2F27-478B-9A76-0BF697F18DB8}" type="datetimeFigureOut">
               <a:rPr lang="es-MX" smtClean="0"/>
-              <a:t>09/02/2026</a:t>
+              <a:t>16/02/2026</a:t>
             </a:fld>
             <a:endParaRPr lang="es-MX"/>
           </a:p>
@@ -13334,7 +13342,7 @@
           <a:p>
             <a:fld id="{1D45F402-2F27-478B-9A76-0BF697F18DB8}" type="datetimeFigureOut">
               <a:rPr lang="es-MX" smtClean="0"/>
-              <a:t>09/02/2026</a:t>
+              <a:t>16/02/2026</a:t>
             </a:fld>
             <a:endParaRPr lang="es-MX"/>
           </a:p>
@@ -13599,7 +13607,7 @@
           <a:p>
             <a:fld id="{1D45F402-2F27-478B-9A76-0BF697F18DB8}" type="datetimeFigureOut">
               <a:rPr lang="es-MX" smtClean="0"/>
-              <a:t>09/02/2026</a:t>
+              <a:t>16/02/2026</a:t>
             </a:fld>
             <a:endParaRPr lang="es-MX"/>
           </a:p>
@@ -14011,7 +14019,7 @@
           <a:p>
             <a:fld id="{1D45F402-2F27-478B-9A76-0BF697F18DB8}" type="datetimeFigureOut">
               <a:rPr lang="es-MX" smtClean="0"/>
-              <a:t>09/02/2026</a:t>
+              <a:t>16/02/2026</a:t>
             </a:fld>
             <a:endParaRPr lang="es-MX"/>
           </a:p>
@@ -14152,7 +14160,7 @@
           <a:p>
             <a:fld id="{1D45F402-2F27-478B-9A76-0BF697F18DB8}" type="datetimeFigureOut">
               <a:rPr lang="es-MX" smtClean="0"/>
-              <a:t>09/02/2026</a:t>
+              <a:t>16/02/2026</a:t>
             </a:fld>
             <a:endParaRPr lang="es-MX"/>
           </a:p>
@@ -14265,7 +14273,7 @@
           <a:p>
             <a:fld id="{1D45F402-2F27-478B-9A76-0BF697F18DB8}" type="datetimeFigureOut">
               <a:rPr lang="es-MX" smtClean="0"/>
-              <a:t>09/02/2026</a:t>
+              <a:t>16/02/2026</a:t>
             </a:fld>
             <a:endParaRPr lang="es-MX"/>
           </a:p>
@@ -14576,7 +14584,7 @@
           <a:p>
             <a:fld id="{1D45F402-2F27-478B-9A76-0BF697F18DB8}" type="datetimeFigureOut">
               <a:rPr lang="es-MX" smtClean="0"/>
-              <a:t>09/02/2026</a:t>
+              <a:t>16/02/2026</a:t>
             </a:fld>
             <a:endParaRPr lang="es-MX"/>
           </a:p>
@@ -14864,7 +14872,7 @@
           <a:p>
             <a:fld id="{1D45F402-2F27-478B-9A76-0BF697F18DB8}" type="datetimeFigureOut">
               <a:rPr lang="es-MX" smtClean="0"/>
-              <a:t>09/02/2026</a:t>
+              <a:t>16/02/2026</a:t>
             </a:fld>
             <a:endParaRPr lang="es-MX"/>
           </a:p>
@@ -15105,7 +15113,7 @@
           <a:p>
             <a:fld id="{1D45F402-2F27-478B-9A76-0BF697F18DB8}" type="datetimeFigureOut">
               <a:rPr lang="es-MX" smtClean="0"/>
-              <a:t>09/02/2026</a:t>
+              <a:t>16/02/2026</a:t>
             </a:fld>
             <a:endParaRPr lang="es-MX"/>
           </a:p>
@@ -15839,6 +15847,529 @@
     <p:extLst>
       <p:ext uri="{BB962C8B-B14F-4D97-AF65-F5344CB8AC3E}">
         <p14:creationId xmlns:p14="http://schemas.microsoft.com/office/powerpoint/2010/main" val="1195338321"/>
+      </p:ext>
+    </p:extLst>
+  </p:cSld>
+  <p:clrMapOvr>
+    <a:masterClrMapping/>
+  </p:clrMapOvr>
+</p:sld>
+</file>
+
+<file path=ppt/slides/slide10.xml><?xml version="1.0" encoding="utf-8"?>
+<p:sld xmlns:a="http://schemas.openxmlformats.org/drawingml/2006/main" xmlns:r="http://schemas.openxmlformats.org/officeDocument/2006/relationships" xmlns:p="http://schemas.openxmlformats.org/presentationml/2006/main">
+  <p:cSld>
+    <p:bg>
+      <p:bgPr>
+        <a:solidFill>
+          <a:schemeClr val="bg1"/>
+        </a:solidFill>
+        <a:effectLst/>
+      </p:bgPr>
+    </p:bg>
+    <p:spTree>
+      <p:nvGrpSpPr>
+        <p:cNvPr id="1" name=""/>
+        <p:cNvGrpSpPr/>
+        <p:nvPr/>
+      </p:nvGrpSpPr>
+      <p:grpSpPr>
+        <a:xfrm>
+          <a:off x="0" y="0"/>
+          <a:ext cx="0" cy="0"/>
+          <a:chOff x="0" y="0"/>
+          <a:chExt cx="0" cy="0"/>
+        </a:xfrm>
+      </p:grpSpPr>
+      <p:sp useBgFill="1">
+        <p:nvSpPr>
+          <p:cNvPr id="9" name="Rectangle 8">
+            <a:extLst>
+              <a:ext uri="{FF2B5EF4-FFF2-40B4-BE49-F238E27FC236}">
+                <a16:creationId xmlns:a16="http://schemas.microsoft.com/office/drawing/2014/main" id="{BACC6370-2D7E-4714-9D71-7542949D7D5D}"/>
+              </a:ext>
+              <a:ext uri="{C183D7F6-B498-43B3-948B-1728B52AA6E4}">
+                <adec:decorative xmlns:adec="http://schemas.microsoft.com/office/drawing/2017/decorative" val="1"/>
+              </a:ext>
+            </a:extLst>
+          </p:cNvPr>
+          <p:cNvSpPr>
+            <a:spLocks noGrp="1" noRot="1" noChangeAspect="1" noMove="1" noResize="1" noEditPoints="1" noAdjustHandles="1" noChangeArrowheads="1" noChangeShapeType="1" noTextEdit="1"/>
+          </p:cNvSpPr>
+          <p:nvPr>
+            <p:extLst>
+              <p:ext uri="{386F3935-93C4-4BCD-93E2-E3B085C9AB24}">
+                <p16:designElem xmlns:p16="http://schemas.microsoft.com/office/powerpoint/2015/main" val="1"/>
+              </p:ext>
+            </p:extLst>
+          </p:nvPr>
+        </p:nvSpPr>
+        <p:spPr>
+          <a:xfrm>
+            <a:off x="0" y="0"/>
+            <a:ext cx="12192000" cy="6858000"/>
+          </a:xfrm>
+          <a:prstGeom prst="rect">
+            <a:avLst/>
+          </a:prstGeom>
+          <a:ln w="12700" cap="flat" cmpd="sng" algn="ctr">
+            <a:noFill/>
+            <a:prstDash val="solid"/>
+            <a:miter lim="800000"/>
+          </a:ln>
+          <a:effectLst/>
+          <a:extLst>
+            <a:ext uri="{91240B29-F687-4F45-9708-019B960494DF}">
+              <a14:hiddenLine xmlns:a14="http://schemas.microsoft.com/office/drawing/2010/main" w="12700" cap="flat" cmpd="sng" algn="ctr">
+                <a:solidFill>
+                  <a:schemeClr val="accent1">
+                    <a:shade val="50000"/>
+                  </a:schemeClr>
+                </a:solidFill>
+                <a:prstDash val="solid"/>
+                <a:miter lim="800000"/>
+              </a14:hiddenLine>
+            </a:ext>
+          </a:extLst>
+        </p:spPr>
+        <p:style>
+          <a:lnRef idx="2">
+            <a:schemeClr val="accent1">
+              <a:shade val="50000"/>
+            </a:schemeClr>
+          </a:lnRef>
+          <a:fillRef idx="1">
+            <a:schemeClr val="accent1"/>
+          </a:fillRef>
+          <a:effectRef idx="0">
+            <a:schemeClr val="accent1"/>
+          </a:effectRef>
+          <a:fontRef idx="minor">
+            <a:schemeClr val="lt1"/>
+          </a:fontRef>
+        </p:style>
+        <p:txBody>
+          <a:bodyPr rtlCol="0" anchor="ctr"/>
+          <a:lstStyle/>
+          <a:p>
+            <a:pPr algn="ctr"/>
+            <a:endParaRPr lang="en-US"/>
+          </a:p>
+        </p:txBody>
+      </p:sp>
+      <p:sp>
+        <p:nvSpPr>
+          <p:cNvPr id="11" name="Rectangle 10">
+            <a:extLst>
+              <a:ext uri="{FF2B5EF4-FFF2-40B4-BE49-F238E27FC236}">
+                <a16:creationId xmlns:a16="http://schemas.microsoft.com/office/drawing/2014/main" id="{F68B3F68-107C-434F-AA38-110D5EA91B85}"/>
+              </a:ext>
+              <a:ext uri="{C183D7F6-B498-43B3-948B-1728B52AA6E4}">
+                <adec:decorative xmlns:adec="http://schemas.microsoft.com/office/drawing/2017/decorative" val="1"/>
+              </a:ext>
+            </a:extLst>
+          </p:cNvPr>
+          <p:cNvSpPr>
+            <a:spLocks noGrp="1" noRot="1" noChangeAspect="1" noMove="1" noResize="1" noEditPoints="1" noAdjustHandles="1" noChangeArrowheads="1" noChangeShapeType="1" noTextEdit="1"/>
+          </p:cNvSpPr>
+          <p:nvPr>
+            <p:extLst>
+              <p:ext uri="{386F3935-93C4-4BCD-93E2-E3B085C9AB24}">
+                <p16:designElem xmlns:p16="http://schemas.microsoft.com/office/powerpoint/2015/main" val="1"/>
+              </p:ext>
+            </p:extLst>
+          </p:nvPr>
+        </p:nvSpPr>
+        <p:spPr>
+          <a:xfrm flipH="1">
+            <a:off x="2" y="0"/>
+            <a:ext cx="12191998" cy="1575955"/>
+          </a:xfrm>
+          <a:prstGeom prst="rect">
+            <a:avLst/>
+          </a:prstGeom>
+          <a:gradFill>
+            <a:gsLst>
+              <a:gs pos="0">
+                <a:srgbClr val="000000">
+                  <a:alpha val="96000"/>
+                </a:srgbClr>
+              </a:gs>
+              <a:gs pos="100000">
+                <a:schemeClr val="accent1">
+                  <a:lumMod val="75000"/>
+                </a:schemeClr>
+              </a:gs>
+            </a:gsLst>
+            <a:lin ang="8400000" scaled="0"/>
+          </a:gradFill>
+          <a:ln>
+            <a:noFill/>
+          </a:ln>
+        </p:spPr>
+        <p:style>
+          <a:lnRef idx="2">
+            <a:schemeClr val="accent1">
+              <a:shade val="50000"/>
+            </a:schemeClr>
+          </a:lnRef>
+          <a:fillRef idx="1">
+            <a:schemeClr val="accent1"/>
+          </a:fillRef>
+          <a:effectRef idx="0">
+            <a:schemeClr val="accent1"/>
+          </a:effectRef>
+          <a:fontRef idx="minor">
+            <a:schemeClr val="lt1"/>
+          </a:fontRef>
+        </p:style>
+        <p:txBody>
+          <a:bodyPr rtlCol="0" anchor="ctr"/>
+          <a:lstStyle/>
+          <a:p>
+            <a:pPr algn="ctr"/>
+            <a:endParaRPr lang="en-US"/>
+          </a:p>
+        </p:txBody>
+      </p:sp>
+      <p:sp>
+        <p:nvSpPr>
+          <p:cNvPr id="13" name="Rectangle 12">
+            <a:extLst>
+              <a:ext uri="{FF2B5EF4-FFF2-40B4-BE49-F238E27FC236}">
+                <a16:creationId xmlns:a16="http://schemas.microsoft.com/office/drawing/2014/main" id="{AAD0DBB9-1A4B-4391-81D4-CB19F9AB918A}"/>
+              </a:ext>
+              <a:ext uri="{C183D7F6-B498-43B3-948B-1728B52AA6E4}">
+                <adec:decorative xmlns:adec="http://schemas.microsoft.com/office/drawing/2017/decorative" val="1"/>
+              </a:ext>
+            </a:extLst>
+          </p:cNvPr>
+          <p:cNvSpPr>
+            <a:spLocks noGrp="1" noRot="1" noChangeAspect="1" noMove="1" noResize="1" noEditPoints="1" noAdjustHandles="1" noChangeArrowheads="1" noChangeShapeType="1" noTextEdit="1"/>
+          </p:cNvSpPr>
+          <p:nvPr>
+            <p:extLst>
+              <p:ext uri="{386F3935-93C4-4BCD-93E2-E3B085C9AB24}">
+                <p16:designElem xmlns:p16="http://schemas.microsoft.com/office/powerpoint/2015/main" val="1"/>
+              </p:ext>
+            </p:extLst>
+          </p:nvPr>
+        </p:nvSpPr>
+        <p:spPr>
+          <a:xfrm rot="10800000" flipH="1">
+            <a:off x="8128857" y="0"/>
+            <a:ext cx="4063143" cy="1576412"/>
+          </a:xfrm>
+          <a:prstGeom prst="rect">
+            <a:avLst/>
+          </a:prstGeom>
+          <a:gradFill>
+            <a:gsLst>
+              <a:gs pos="19000">
+                <a:schemeClr val="accent1">
+                  <a:lumMod val="50000"/>
+                  <a:alpha val="68000"/>
+                </a:schemeClr>
+              </a:gs>
+              <a:gs pos="100000">
+                <a:schemeClr val="accent1">
+                  <a:alpha val="79000"/>
+                </a:schemeClr>
+              </a:gs>
+            </a:gsLst>
+            <a:lin ang="19200000" scaled="0"/>
+          </a:gradFill>
+          <a:ln>
+            <a:noFill/>
+          </a:ln>
+        </p:spPr>
+        <p:style>
+          <a:lnRef idx="2">
+            <a:schemeClr val="accent1">
+              <a:shade val="50000"/>
+            </a:schemeClr>
+          </a:lnRef>
+          <a:fillRef idx="1">
+            <a:schemeClr val="accent1"/>
+          </a:fillRef>
+          <a:effectRef idx="0">
+            <a:schemeClr val="accent1"/>
+          </a:effectRef>
+          <a:fontRef idx="minor">
+            <a:schemeClr val="lt1"/>
+          </a:fontRef>
+        </p:style>
+        <p:txBody>
+          <a:bodyPr rtlCol="0" anchor="ctr"/>
+          <a:lstStyle/>
+          <a:p>
+            <a:pPr algn="ctr"/>
+            <a:endParaRPr lang="en-US"/>
+          </a:p>
+        </p:txBody>
+      </p:sp>
+      <p:sp>
+        <p:nvSpPr>
+          <p:cNvPr id="15" name="Rectangle 14">
+            <a:extLst>
+              <a:ext uri="{FF2B5EF4-FFF2-40B4-BE49-F238E27FC236}">
+                <a16:creationId xmlns:a16="http://schemas.microsoft.com/office/drawing/2014/main" id="{063BBA22-50EA-4C4D-BE05-F1CE4E63AA56}"/>
+              </a:ext>
+              <a:ext uri="{C183D7F6-B498-43B3-948B-1728B52AA6E4}">
+                <adec:decorative xmlns:adec="http://schemas.microsoft.com/office/drawing/2017/decorative" val="1"/>
+              </a:ext>
+            </a:extLst>
+          </p:cNvPr>
+          <p:cNvSpPr>
+            <a:spLocks noGrp="1" noRot="1" noChangeAspect="1" noMove="1" noResize="1" noEditPoints="1" noAdjustHandles="1" noChangeArrowheads="1" noChangeShapeType="1" noTextEdit="1"/>
+          </p:cNvSpPr>
+          <p:nvPr>
+            <p:extLst>
+              <p:ext uri="{386F3935-93C4-4BCD-93E2-E3B085C9AB24}">
+                <p16:designElem xmlns:p16="http://schemas.microsoft.com/office/powerpoint/2015/main" val="1"/>
+              </p:ext>
+            </p:extLst>
+          </p:nvPr>
+        </p:nvSpPr>
+        <p:spPr>
+          <a:xfrm rot="5400000">
+            <a:off x="5307777" y="-5307778"/>
+            <a:ext cx="1576446" cy="12192002"/>
+          </a:xfrm>
+          <a:prstGeom prst="rect">
+            <a:avLst/>
+          </a:prstGeom>
+          <a:gradFill>
+            <a:gsLst>
+              <a:gs pos="23000">
+                <a:schemeClr val="accent1">
+                  <a:alpha val="0"/>
+                </a:schemeClr>
+              </a:gs>
+              <a:gs pos="99000">
+                <a:srgbClr val="000000">
+                  <a:alpha val="74000"/>
+                </a:srgbClr>
+              </a:gs>
+            </a:gsLst>
+            <a:lin ang="20400000" scaled="0"/>
+          </a:gradFill>
+          <a:ln>
+            <a:noFill/>
+          </a:ln>
+        </p:spPr>
+        <p:style>
+          <a:lnRef idx="2">
+            <a:schemeClr val="accent1">
+              <a:shade val="50000"/>
+            </a:schemeClr>
+          </a:lnRef>
+          <a:fillRef idx="1">
+            <a:schemeClr val="accent1"/>
+          </a:fillRef>
+          <a:effectRef idx="0">
+            <a:schemeClr val="accent1"/>
+          </a:effectRef>
+          <a:fontRef idx="minor">
+            <a:schemeClr val="lt1"/>
+          </a:fontRef>
+        </p:style>
+        <p:txBody>
+          <a:bodyPr rtlCol="0" anchor="ctr"/>
+          <a:lstStyle/>
+          <a:p>
+            <a:pPr algn="ctr"/>
+            <a:endParaRPr lang="en-US" dirty="0"/>
+          </a:p>
+        </p:txBody>
+      </p:sp>
+      <p:sp>
+        <p:nvSpPr>
+          <p:cNvPr id="2" name="Título 1">
+            <a:extLst>
+              <a:ext uri="{FF2B5EF4-FFF2-40B4-BE49-F238E27FC236}">
+                <a16:creationId xmlns:a16="http://schemas.microsoft.com/office/drawing/2014/main" id="{F0292DAD-D95C-EBF9-78BC-92439399D3F3}"/>
+              </a:ext>
+            </a:extLst>
+          </p:cNvPr>
+          <p:cNvSpPr>
+            <a:spLocks noGrp="1"/>
+          </p:cNvSpPr>
+          <p:nvPr>
+            <p:ph type="title"/>
+          </p:nvPr>
+        </p:nvSpPr>
+        <p:spPr>
+          <a:xfrm>
+            <a:off x="1371597" y="348865"/>
+            <a:ext cx="10044023" cy="877729"/>
+          </a:xfrm>
+        </p:spPr>
+        <p:txBody>
+          <a:bodyPr anchor="ctr">
+            <a:normAutofit/>
+          </a:bodyPr>
+          <a:lstStyle/>
+          <a:p>
+            <a:r>
+              <a:rPr lang="es-MX" sz="4000" dirty="0">
+                <a:solidFill>
+                  <a:srgbClr val="FFFFFF"/>
+                </a:solidFill>
+              </a:rPr>
+              <a:t>Entorno y software requerido</a:t>
+            </a:r>
+          </a:p>
+        </p:txBody>
+      </p:sp>
+      <p:graphicFrame>
+        <p:nvGraphicFramePr>
+          <p:cNvPr id="5" name="Marcador de contenido 2">
+            <a:extLst>
+              <a:ext uri="{FF2B5EF4-FFF2-40B4-BE49-F238E27FC236}">
+                <a16:creationId xmlns:a16="http://schemas.microsoft.com/office/drawing/2014/main" id="{C5485C89-E65B-42F4-5C18-5B03EB649BB7}"/>
+              </a:ext>
+            </a:extLst>
+          </p:cNvPr>
+          <p:cNvGraphicFramePr>
+            <a:graphicFrameLocks noGrp="1"/>
+          </p:cNvGraphicFramePr>
+          <p:nvPr>
+            <p:ph idx="1"/>
+            <p:extLst>
+              <p:ext uri="{D42A27DB-BD31-4B8C-83A1-F6EECF244321}">
+                <p14:modId xmlns:p14="http://schemas.microsoft.com/office/powerpoint/2010/main" val="4267278157"/>
+              </p:ext>
+            </p:extLst>
+          </p:nvPr>
+        </p:nvGraphicFramePr>
+        <p:xfrm>
+          <a:off x="644056" y="2112579"/>
+          <a:ext cx="10927829" cy="4192805"/>
+        </p:xfrm>
+        <a:graphic>
+          <a:graphicData uri="http://schemas.openxmlformats.org/drawingml/2006/diagram">
+            <dgm:relIds xmlns:dgm="http://schemas.openxmlformats.org/drawingml/2006/diagram" xmlns:r="http://schemas.openxmlformats.org/officeDocument/2006/relationships" r:dm="rId2" r:lo="rId3" r:qs="rId4" r:cs="rId5"/>
+          </a:graphicData>
+        </a:graphic>
+      </p:graphicFrame>
+    </p:spTree>
+    <p:extLst>
+      <p:ext uri="{BB962C8B-B14F-4D97-AF65-F5344CB8AC3E}">
+        <p14:creationId xmlns:p14="http://schemas.microsoft.com/office/powerpoint/2010/main" val="3478704026"/>
+      </p:ext>
+    </p:extLst>
+  </p:cSld>
+  <p:clrMapOvr>
+    <a:masterClrMapping/>
+  </p:clrMapOvr>
+</p:sld>
+</file>
+
+<file path=ppt/slides/slide11.xml><?xml version="1.0" encoding="utf-8"?>
+<p:sld xmlns:a="http://schemas.openxmlformats.org/drawingml/2006/main" xmlns:r="http://schemas.openxmlformats.org/officeDocument/2006/relationships" xmlns:p="http://schemas.openxmlformats.org/presentationml/2006/main">
+  <p:cSld>
+    <p:spTree>
+      <p:nvGrpSpPr>
+        <p:cNvPr id="1" name=""/>
+        <p:cNvGrpSpPr/>
+        <p:nvPr/>
+      </p:nvGrpSpPr>
+      <p:grpSpPr>
+        <a:xfrm>
+          <a:off x="0" y="0"/>
+          <a:ext cx="0" cy="0"/>
+          <a:chOff x="0" y="0"/>
+          <a:chExt cx="0" cy="0"/>
+        </a:xfrm>
+      </p:grpSpPr>
+      <p:sp>
+        <p:nvSpPr>
+          <p:cNvPr id="2" name="Título 1">
+            <a:extLst>
+              <a:ext uri="{FF2B5EF4-FFF2-40B4-BE49-F238E27FC236}">
+                <a16:creationId xmlns:a16="http://schemas.microsoft.com/office/drawing/2014/main" id="{D392875E-468F-F517-D515-D5A703F4C03E}"/>
+              </a:ext>
+            </a:extLst>
+          </p:cNvPr>
+          <p:cNvSpPr>
+            <a:spLocks noGrp="1"/>
+          </p:cNvSpPr>
+          <p:nvPr>
+            <p:ph type="title"/>
+          </p:nvPr>
+        </p:nvSpPr>
+        <p:spPr/>
+        <p:txBody>
+          <a:bodyPr/>
+          <a:lstStyle/>
+          <a:p>
+            <a:r>
+              <a:rPr lang="es-MX" dirty="0"/>
+              <a:t>Usuarios / accesos</a:t>
+            </a:r>
+          </a:p>
+        </p:txBody>
+      </p:sp>
+      <p:sp>
+        <p:nvSpPr>
+          <p:cNvPr id="3" name="Marcador de contenido 2">
+            <a:extLst>
+              <a:ext uri="{FF2B5EF4-FFF2-40B4-BE49-F238E27FC236}">
+                <a16:creationId xmlns:a16="http://schemas.microsoft.com/office/drawing/2014/main" id="{0031DBAA-87EB-B817-CC15-03ECA7D4D552}"/>
+              </a:ext>
+            </a:extLst>
+          </p:cNvPr>
+          <p:cNvSpPr>
+            <a:spLocks noGrp="1"/>
+          </p:cNvSpPr>
+          <p:nvPr>
+            <p:ph idx="1"/>
+          </p:nvPr>
+        </p:nvSpPr>
+        <p:spPr/>
+        <p:txBody>
+          <a:bodyPr/>
+          <a:lstStyle/>
+          <a:p>
+            <a:r>
+              <a:rPr lang="es-MX" dirty="0"/>
+              <a:t>BD</a:t>
+            </a:r>
+          </a:p>
+          <a:p>
+            <a:pPr lvl="1"/>
+            <a:r>
+              <a:rPr lang="es-MX" dirty="0" err="1"/>
+              <a:t>Catalogo_db</a:t>
+            </a:r>
+            <a:r>
+              <a:rPr lang="es-MX" dirty="0"/>
+              <a:t>: </a:t>
+            </a:r>
+            <a:r>
+              <a:rPr lang="es-MX" dirty="0" err="1"/>
+              <a:t>sgonzalezm</a:t>
+            </a:r>
+            <a:r>
+              <a:rPr lang="es-MX"/>
+              <a:t> – 3lR10Quefluye$</a:t>
+            </a:r>
+          </a:p>
+          <a:p>
+            <a:pPr lvl="1"/>
+            <a:endParaRPr lang="es-MX"/>
+          </a:p>
+          <a:p>
+            <a:pPr lvl="1"/>
+            <a:endParaRPr lang="es-MX" dirty="0"/>
+          </a:p>
+        </p:txBody>
+      </p:sp>
+    </p:spTree>
+    <p:extLst>
+      <p:ext uri="{BB962C8B-B14F-4D97-AF65-F5344CB8AC3E}">
+        <p14:creationId xmlns:p14="http://schemas.microsoft.com/office/powerpoint/2010/main" val="759370837"/>
       </p:ext>
     </p:extLst>
   </p:cSld>
@@ -18559,6 +19090,544 @@
 <file path=ppt/slides/slide5.xml><?xml version="1.0" encoding="utf-8"?>
 <p:sld xmlns:a="http://schemas.openxmlformats.org/drawingml/2006/main" xmlns:r="http://schemas.openxmlformats.org/officeDocument/2006/relationships" xmlns:p="http://schemas.openxmlformats.org/presentationml/2006/main">
   <p:cSld>
+    <p:spTree>
+      <p:nvGrpSpPr>
+        <p:cNvPr id="1" name=""/>
+        <p:cNvGrpSpPr/>
+        <p:nvPr/>
+      </p:nvGrpSpPr>
+      <p:grpSpPr>
+        <a:xfrm>
+          <a:off x="0" y="0"/>
+          <a:ext cx="0" cy="0"/>
+          <a:chOff x="0" y="0"/>
+          <a:chExt cx="0" cy="0"/>
+        </a:xfrm>
+      </p:grpSpPr>
+      <p:sp>
+        <p:nvSpPr>
+          <p:cNvPr id="2" name="Título 1">
+            <a:extLst>
+              <a:ext uri="{FF2B5EF4-FFF2-40B4-BE49-F238E27FC236}">
+                <a16:creationId xmlns:a16="http://schemas.microsoft.com/office/drawing/2014/main" id="{FA61D7A5-4E54-408D-7695-ECCB3BD576BA}"/>
+              </a:ext>
+            </a:extLst>
+          </p:cNvPr>
+          <p:cNvSpPr>
+            <a:spLocks noGrp="1"/>
+          </p:cNvSpPr>
+          <p:nvPr>
+            <p:ph type="title"/>
+          </p:nvPr>
+        </p:nvSpPr>
+        <p:spPr/>
+        <p:txBody>
+          <a:bodyPr/>
+          <a:lstStyle/>
+          <a:p>
+            <a:r>
+              <a:rPr lang="es-MX" dirty="0"/>
+              <a:t>Estructura catalogo de productos</a:t>
+            </a:r>
+          </a:p>
+        </p:txBody>
+      </p:sp>
+      <p:sp>
+        <p:nvSpPr>
+          <p:cNvPr id="3" name="Marcador de contenido 2">
+            <a:extLst>
+              <a:ext uri="{FF2B5EF4-FFF2-40B4-BE49-F238E27FC236}">
+                <a16:creationId xmlns:a16="http://schemas.microsoft.com/office/drawing/2014/main" id="{665E2DCB-E6E5-182C-9CC3-5FACE4DDCB8F}"/>
+              </a:ext>
+            </a:extLst>
+          </p:cNvPr>
+          <p:cNvSpPr>
+            <a:spLocks noGrp="1"/>
+          </p:cNvSpPr>
+          <p:nvPr>
+            <p:ph idx="1"/>
+          </p:nvPr>
+        </p:nvSpPr>
+        <p:spPr>
+          <a:xfrm>
+            <a:off x="524933" y="1690688"/>
+            <a:ext cx="5503333" cy="4882622"/>
+          </a:xfrm>
+        </p:spPr>
+        <p:txBody>
+          <a:bodyPr>
+            <a:normAutofit fontScale="40000" lnSpcReduction="20000"/>
+          </a:bodyPr>
+          <a:lstStyle/>
+          <a:p>
+            <a:pPr latinLnBrk="1"/>
+            <a:r>
+              <a:rPr lang="es-MX" sz="3000" dirty="0"/>
+              <a:t>PASO 1: Instalar Django y MySQL </a:t>
+            </a:r>
+            <a:r>
+              <a:rPr lang="es-MX" sz="3000" dirty="0" err="1"/>
+              <a:t>connector</a:t>
+            </a:r>
+            <a:endParaRPr lang="es-MX" sz="3000" dirty="0"/>
+          </a:p>
+          <a:p>
+            <a:pPr latinLnBrk="1"/>
+            <a:r>
+              <a:rPr lang="es-MX" sz="3000" dirty="0"/>
+              <a:t>PASO 2: Crear proyecto Django</a:t>
+            </a:r>
+          </a:p>
+          <a:p>
+            <a:pPr latinLnBrk="1"/>
+            <a:r>
+              <a:rPr lang="es-MX" sz="3000" dirty="0"/>
+              <a:t>PASO 3: Configurar conexión a MySQL</a:t>
+            </a:r>
+          </a:p>
+          <a:p>
+            <a:pPr latinLnBrk="1"/>
+            <a:r>
+              <a:rPr lang="es-MX" sz="3000" dirty="0"/>
+              <a:t>PASO 4: Crear app "catalogo"</a:t>
+            </a:r>
+          </a:p>
+          <a:p>
+            <a:pPr latinLnBrk="1"/>
+            <a:r>
+              <a:rPr lang="es-MX" sz="3000" dirty="0"/>
+              <a:t>PASO 5: Crear </a:t>
+            </a:r>
+            <a:r>
+              <a:rPr lang="es-MX" sz="3000" dirty="0" err="1"/>
+              <a:t>superusuario</a:t>
+            </a:r>
+            <a:endParaRPr lang="es-MX" sz="3000" dirty="0"/>
+          </a:p>
+          <a:p>
+            <a:pPr latinLnBrk="1"/>
+            <a:r>
+              <a:rPr lang="es-MX" sz="3000" dirty="0"/>
+              <a:t>PASO 6: Verificar que </a:t>
+            </a:r>
+            <a:r>
+              <a:rPr lang="es-MX" sz="3000" dirty="0" err="1"/>
+              <a:t>admin</a:t>
+            </a:r>
+            <a:r>
+              <a:rPr lang="es-MX" sz="3000" dirty="0"/>
+              <a:t> panel funciona</a:t>
+            </a:r>
+          </a:p>
+          <a:p>
+            <a:pPr latinLnBrk="1"/>
+            <a:r>
+              <a:rPr lang="es-MX" sz="3000" dirty="0"/>
+              <a:t>PASO 7: Crear modelo </a:t>
+            </a:r>
+            <a:r>
+              <a:rPr lang="es-MX" sz="3000" dirty="0" err="1"/>
+              <a:t>Categoria</a:t>
+            </a:r>
+            <a:r>
+              <a:rPr lang="es-MX" sz="3000" dirty="0"/>
+              <a:t> (nombre, descripción)</a:t>
+            </a:r>
+          </a:p>
+          <a:p>
+            <a:pPr latinLnBrk="1"/>
+            <a:r>
+              <a:rPr lang="es-MX" sz="3000" dirty="0"/>
+              <a:t>PASO 8: Crear modelo Producto (nombre, descripción, precio, imagen)</a:t>
+            </a:r>
+          </a:p>
+          <a:p>
+            <a:pPr latinLnBrk="1"/>
+            <a:r>
+              <a:rPr lang="es-MX" sz="3000" dirty="0"/>
+              <a:t>PASO 9: Registrar modelos en </a:t>
+            </a:r>
+            <a:r>
+              <a:rPr lang="es-MX" sz="3000" dirty="0" err="1"/>
+              <a:t>admin</a:t>
+            </a:r>
+            <a:endParaRPr lang="es-MX" sz="3000" dirty="0"/>
+          </a:p>
+          <a:p>
+            <a:pPr latinLnBrk="1"/>
+            <a:r>
+              <a:rPr lang="es-MX" sz="3000" dirty="0"/>
+              <a:t>PASO 10: Hacer migraciones</a:t>
+            </a:r>
+          </a:p>
+          <a:p>
+            <a:pPr latinLnBrk="1"/>
+            <a:r>
+              <a:rPr lang="es-MX" sz="3000" dirty="0"/>
+              <a:t>PASO 11: Probar </a:t>
+            </a:r>
+            <a:r>
+              <a:rPr lang="es-MX" sz="3000" dirty="0" err="1"/>
+              <a:t>admin</a:t>
+            </a:r>
+            <a:r>
+              <a:rPr lang="es-MX" sz="3000" dirty="0"/>
+              <a:t> (agregar 2-3 productos manualmente)</a:t>
+            </a:r>
+          </a:p>
+          <a:p>
+            <a:pPr latinLnBrk="1"/>
+            <a:r>
+              <a:rPr lang="es-MX" sz="3000" dirty="0"/>
+              <a:t>PASO 12: Instalar Django REST Framework</a:t>
+            </a:r>
+          </a:p>
+          <a:p>
+            <a:pPr latinLnBrk="1"/>
+            <a:r>
+              <a:rPr lang="es-MX" sz="3000" dirty="0"/>
+              <a:t>PASO 13: Crear </a:t>
+            </a:r>
+            <a:r>
+              <a:rPr lang="es-MX" sz="3000" dirty="0" err="1"/>
+              <a:t>serializer</a:t>
+            </a:r>
+            <a:r>
+              <a:rPr lang="es-MX" sz="3000" dirty="0"/>
+              <a:t> de Producto</a:t>
+            </a:r>
+          </a:p>
+          <a:p>
+            <a:pPr latinLnBrk="1"/>
+            <a:r>
+              <a:rPr lang="es-MX" sz="3000" dirty="0"/>
+              <a:t>PASO 14: Crear vista API (</a:t>
+            </a:r>
+            <a:r>
+              <a:rPr lang="es-MX" sz="3000" dirty="0" err="1"/>
+              <a:t>endpoint</a:t>
+            </a:r>
+            <a:r>
+              <a:rPr lang="es-MX" sz="3000" dirty="0"/>
+              <a:t>) para listar productos</a:t>
+            </a:r>
+          </a:p>
+          <a:p>
+            <a:pPr latinLnBrk="1"/>
+            <a:r>
+              <a:rPr lang="es-MX" sz="3000" dirty="0"/>
+              <a:t>PASO 15: Probar que http://localhost:8000/api/productos/ devuelve JSON</a:t>
+            </a:r>
+          </a:p>
+          <a:p>
+            <a:pPr latinLnBrk="1"/>
+            <a:r>
+              <a:rPr lang="es-MX" sz="3000" dirty="0"/>
+              <a:t>PASO 16: En el landing page, crear archivo JS que haga </a:t>
+            </a:r>
+            <a:r>
+              <a:rPr lang="es-MX" sz="3000" dirty="0" err="1"/>
+              <a:t>fetch</a:t>
+            </a:r>
+            <a:r>
+              <a:rPr lang="es-MX" sz="3000" dirty="0"/>
+              <a:t> a la API</a:t>
+            </a:r>
+          </a:p>
+          <a:p>
+            <a:pPr latinLnBrk="1"/>
+            <a:r>
+              <a:rPr lang="es-MX" sz="3000" dirty="0"/>
+              <a:t>PASO 17: Mostrar productos en catálogo usando JavaScript</a:t>
+            </a:r>
+          </a:p>
+          <a:p>
+            <a:pPr latinLnBrk="1"/>
+            <a:r>
+              <a:rPr lang="es-MX" sz="3000" dirty="0"/>
+              <a:t>PASO 18: Probar que se ven los productos desde el </a:t>
+            </a:r>
+            <a:r>
+              <a:rPr lang="es-MX" sz="3000" dirty="0" err="1"/>
+              <a:t>admin</a:t>
+            </a:r>
+            <a:endParaRPr lang="es-MX" sz="3000" dirty="0"/>
+          </a:p>
+          <a:p>
+            <a:endParaRPr lang="es-MX" dirty="0"/>
+          </a:p>
+        </p:txBody>
+      </p:sp>
+      <p:sp>
+        <p:nvSpPr>
+          <p:cNvPr id="4" name="CuadroTexto 3">
+            <a:extLst>
+              <a:ext uri="{FF2B5EF4-FFF2-40B4-BE49-F238E27FC236}">
+                <a16:creationId xmlns:a16="http://schemas.microsoft.com/office/drawing/2014/main" id="{4F7FE6CF-3C12-12D5-9989-F003A8DC1C50}"/>
+              </a:ext>
+            </a:extLst>
+          </p:cNvPr>
+          <p:cNvSpPr txBox="1"/>
+          <p:nvPr/>
+        </p:nvSpPr>
+        <p:spPr>
+          <a:xfrm>
+            <a:off x="6375401" y="1896003"/>
+            <a:ext cx="4064000" cy="2462213"/>
+          </a:xfrm>
+          <a:prstGeom prst="rect">
+            <a:avLst/>
+          </a:prstGeom>
+          <a:noFill/>
+        </p:spPr>
+        <p:txBody>
+          <a:bodyPr wrap="square" rtlCol="0">
+            <a:spAutoFit/>
+          </a:bodyPr>
+          <a:lstStyle/>
+          <a:p>
+            <a:r>
+              <a:rPr lang="es-MX" sz="1100" dirty="0"/>
+              <a:t>C:\quimicos_factory\</a:t>
+            </a:r>
+          </a:p>
+          <a:p>
+            <a:r>
+              <a:rPr lang="es-MX" sz="1100" dirty="0"/>
+              <a:t>│</a:t>
+            </a:r>
+          </a:p>
+          <a:p>
+            <a:r>
+              <a:rPr lang="es-MX" sz="1100" dirty="0"/>
+              <a:t>├── </a:t>
+            </a:r>
+            <a:r>
+              <a:rPr lang="es-MX" sz="1100" dirty="0" err="1"/>
+              <a:t>landing_page</a:t>
+            </a:r>
+            <a:r>
+              <a:rPr lang="es-MX" sz="1100" dirty="0"/>
+              <a:t>\          # </a:t>
+            </a:r>
+            <a:r>
+              <a:rPr lang="es-MX" sz="1100" dirty="0" err="1"/>
+              <a:t>Frontend</a:t>
+            </a:r>
+            <a:r>
+              <a:rPr lang="es-MX" sz="1100" dirty="0"/>
+              <a:t> (ya lo tienes)</a:t>
+            </a:r>
+          </a:p>
+          <a:p>
+            <a:r>
+              <a:rPr lang="es-MX" sz="1100" dirty="0"/>
+              <a:t>│   ├── index.html</a:t>
+            </a:r>
+          </a:p>
+          <a:p>
+            <a:r>
+              <a:rPr lang="es-MX" sz="1100" dirty="0"/>
+              <a:t>│   ├── </a:t>
+            </a:r>
+            <a:r>
+              <a:rPr lang="es-MX" sz="1100" dirty="0" err="1"/>
+              <a:t>css</a:t>
+            </a:r>
+            <a:r>
+              <a:rPr lang="es-MX" sz="1100" dirty="0"/>
+              <a:t>\</a:t>
+            </a:r>
+          </a:p>
+          <a:p>
+            <a:r>
+              <a:rPr lang="es-MX" sz="1100" dirty="0"/>
+              <a:t>│   ├── </a:t>
+            </a:r>
+            <a:r>
+              <a:rPr lang="es-MX" sz="1100" dirty="0" err="1"/>
+              <a:t>js</a:t>
+            </a:r>
+            <a:r>
+              <a:rPr lang="es-MX" sz="1100" dirty="0"/>
+              <a:t>\</a:t>
+            </a:r>
+          </a:p>
+          <a:p>
+            <a:r>
+              <a:rPr lang="es-MX" sz="1100" dirty="0"/>
+              <a:t>│   └── </a:t>
+            </a:r>
+            <a:r>
+              <a:rPr lang="es-MX" sz="1100" dirty="0" err="1"/>
+              <a:t>images</a:t>
+            </a:r>
+            <a:r>
+              <a:rPr lang="es-MX" sz="1100" dirty="0"/>
+              <a:t>\</a:t>
+            </a:r>
+          </a:p>
+          <a:p>
+            <a:r>
+              <a:rPr lang="es-MX" sz="1100" dirty="0"/>
+              <a:t>│</a:t>
+            </a:r>
+          </a:p>
+          <a:p>
+            <a:r>
+              <a:rPr lang="es-MX" sz="1100" dirty="0"/>
+              <a:t>└── </a:t>
+            </a:r>
+            <a:r>
+              <a:rPr lang="es-MX" sz="1100" dirty="0" err="1"/>
+              <a:t>admin_portal</a:t>
+            </a:r>
+            <a:r>
+              <a:rPr lang="es-MX" sz="1100" dirty="0"/>
+              <a:t>\          # Backend (nuevo)</a:t>
+            </a:r>
+          </a:p>
+          <a:p>
+            <a:r>
+              <a:rPr lang="es-MX" sz="1100" dirty="0"/>
+              <a:t>    ├── manage.py</a:t>
+            </a:r>
+          </a:p>
+          <a:p>
+            <a:r>
+              <a:rPr lang="es-MX" sz="1100" dirty="0"/>
+              <a:t>    ├── db.sqlite3</a:t>
+            </a:r>
+          </a:p>
+          <a:p>
+            <a:r>
+              <a:rPr lang="es-MX" sz="1100" dirty="0"/>
+              <a:t>    ├── </a:t>
+            </a:r>
+            <a:r>
+              <a:rPr lang="es-MX" sz="1100" dirty="0" err="1"/>
+              <a:t>config</a:t>
+            </a:r>
+            <a:r>
+              <a:rPr lang="es-MX" sz="1100" dirty="0"/>
+              <a:t>\            # Configuración Django</a:t>
+            </a:r>
+          </a:p>
+          <a:p>
+            <a:r>
+              <a:rPr lang="es-MX" sz="1100" dirty="0"/>
+              <a:t>    ├── catalogo\           # App de productos</a:t>
+            </a:r>
+          </a:p>
+          <a:p>
+            <a:r>
+              <a:rPr lang="es-MX" sz="1100" dirty="0"/>
+              <a:t>    └── api\                # </a:t>
+            </a:r>
+            <a:r>
+              <a:rPr lang="es-MX" sz="1100" dirty="0" err="1"/>
+              <a:t>Endpoints</a:t>
+            </a:r>
+            <a:endParaRPr lang="es-MX" dirty="0"/>
+          </a:p>
+        </p:txBody>
+      </p:sp>
+    </p:spTree>
+    <p:extLst>
+      <p:ext uri="{BB962C8B-B14F-4D97-AF65-F5344CB8AC3E}">
+        <p14:creationId xmlns:p14="http://schemas.microsoft.com/office/powerpoint/2010/main" val="2919414649"/>
+      </p:ext>
+    </p:extLst>
+  </p:cSld>
+  <p:clrMapOvr>
+    <a:masterClrMapping/>
+  </p:clrMapOvr>
+</p:sld>
+</file>
+
+<file path=ppt/slides/slide6.xml><?xml version="1.0" encoding="utf-8"?>
+<p:sld xmlns:a="http://schemas.openxmlformats.org/drawingml/2006/main" xmlns:r="http://schemas.openxmlformats.org/officeDocument/2006/relationships" xmlns:p="http://schemas.openxmlformats.org/presentationml/2006/main">
+  <p:cSld>
+    <p:spTree>
+      <p:nvGrpSpPr>
+        <p:cNvPr id="1" name=""/>
+        <p:cNvGrpSpPr/>
+        <p:nvPr/>
+      </p:nvGrpSpPr>
+      <p:grpSpPr>
+        <a:xfrm>
+          <a:off x="0" y="0"/>
+          <a:ext cx="0" cy="0"/>
+          <a:chOff x="0" y="0"/>
+          <a:chExt cx="0" cy="0"/>
+        </a:xfrm>
+      </p:grpSpPr>
+      <p:sp>
+        <p:nvSpPr>
+          <p:cNvPr id="2" name="Título 1">
+            <a:extLst>
+              <a:ext uri="{FF2B5EF4-FFF2-40B4-BE49-F238E27FC236}">
+                <a16:creationId xmlns:a16="http://schemas.microsoft.com/office/drawing/2014/main" id="{115D80C7-5BF1-DBB1-A40E-947C866DC2F1}"/>
+              </a:ext>
+            </a:extLst>
+          </p:cNvPr>
+          <p:cNvSpPr>
+            <a:spLocks noGrp="1"/>
+          </p:cNvSpPr>
+          <p:nvPr>
+            <p:ph type="title"/>
+          </p:nvPr>
+        </p:nvSpPr>
+        <p:spPr/>
+        <p:txBody>
+          <a:bodyPr/>
+          <a:lstStyle/>
+          <a:p>
+            <a:endParaRPr lang="es-MX"/>
+          </a:p>
+        </p:txBody>
+      </p:sp>
+      <p:sp>
+        <p:nvSpPr>
+          <p:cNvPr id="3" name="Marcador de contenido 2">
+            <a:extLst>
+              <a:ext uri="{FF2B5EF4-FFF2-40B4-BE49-F238E27FC236}">
+                <a16:creationId xmlns:a16="http://schemas.microsoft.com/office/drawing/2014/main" id="{5C63DD41-9DFA-B27D-FEE3-7FED483D62BD}"/>
+              </a:ext>
+            </a:extLst>
+          </p:cNvPr>
+          <p:cNvSpPr>
+            <a:spLocks noGrp="1"/>
+          </p:cNvSpPr>
+          <p:nvPr>
+            <p:ph idx="1"/>
+          </p:nvPr>
+        </p:nvSpPr>
+        <p:spPr/>
+        <p:txBody>
+          <a:bodyPr/>
+          <a:lstStyle/>
+          <a:p>
+            <a:endParaRPr lang="es-MX"/>
+          </a:p>
+        </p:txBody>
+      </p:sp>
+    </p:spTree>
+    <p:extLst>
+      <p:ext uri="{BB962C8B-B14F-4D97-AF65-F5344CB8AC3E}">
+        <p14:creationId xmlns:p14="http://schemas.microsoft.com/office/powerpoint/2010/main" val="457207577"/>
+      </p:ext>
+    </p:extLst>
+  </p:cSld>
+  <p:clrMapOvr>
+    <a:masterClrMapping/>
+  </p:clrMapOvr>
+</p:sld>
+</file>
+
+<file path=ppt/slides/slide7.xml><?xml version="1.0" encoding="utf-8"?>
+<p:sld xmlns:a="http://schemas.openxmlformats.org/drawingml/2006/main" xmlns:r="http://schemas.openxmlformats.org/officeDocument/2006/relationships" xmlns:p="http://schemas.openxmlformats.org/presentationml/2006/main">
+  <p:cSld>
     <p:bg>
       <p:bgPr>
         <a:solidFill>
@@ -19017,7 +20086,7 @@
 </p:sld>
 </file>
 
-<file path=ppt/slides/slide6.xml><?xml version="1.0" encoding="utf-8"?>
+<file path=ppt/slides/slide8.xml><?xml version="1.0" encoding="utf-8"?>
 <p:sld xmlns:a="http://schemas.openxmlformats.org/drawingml/2006/main" xmlns:r="http://schemas.openxmlformats.org/officeDocument/2006/relationships" xmlns:p="http://schemas.openxmlformats.org/presentationml/2006/main">
   <p:cSld>
     <p:bg>
@@ -19948,7 +21017,7 @@
 </p:sld>
 </file>
 
-<file path=ppt/slides/slide7.xml><?xml version="1.0" encoding="utf-8"?>
+<file path=ppt/slides/slide9.xml><?xml version="1.0" encoding="utf-8"?>
 <p:sld xmlns:a="http://schemas.openxmlformats.org/drawingml/2006/main" xmlns:r="http://schemas.openxmlformats.org/officeDocument/2006/relationships" xmlns:p="http://schemas.openxmlformats.org/presentationml/2006/main">
   <p:cSld>
     <p:bg>
@@ -20171,416 +21240,6 @@
     <p:extLst>
       <p:ext uri="{BB962C8B-B14F-4D97-AF65-F5344CB8AC3E}">
         <p14:creationId xmlns:p14="http://schemas.microsoft.com/office/powerpoint/2010/main" val="425830081"/>
-      </p:ext>
-    </p:extLst>
-  </p:cSld>
-  <p:clrMapOvr>
-    <a:masterClrMapping/>
-  </p:clrMapOvr>
-</p:sld>
-</file>
-
-<file path=ppt/slides/slide8.xml><?xml version="1.0" encoding="utf-8"?>
-<p:sld xmlns:a="http://schemas.openxmlformats.org/drawingml/2006/main" xmlns:r="http://schemas.openxmlformats.org/officeDocument/2006/relationships" xmlns:p="http://schemas.openxmlformats.org/presentationml/2006/main">
-  <p:cSld>
-    <p:bg>
-      <p:bgPr>
-        <a:solidFill>
-          <a:schemeClr val="bg1"/>
-        </a:solidFill>
-        <a:effectLst/>
-      </p:bgPr>
-    </p:bg>
-    <p:spTree>
-      <p:nvGrpSpPr>
-        <p:cNvPr id="1" name=""/>
-        <p:cNvGrpSpPr/>
-        <p:nvPr/>
-      </p:nvGrpSpPr>
-      <p:grpSpPr>
-        <a:xfrm>
-          <a:off x="0" y="0"/>
-          <a:ext cx="0" cy="0"/>
-          <a:chOff x="0" y="0"/>
-          <a:chExt cx="0" cy="0"/>
-        </a:xfrm>
-      </p:grpSpPr>
-      <p:sp useBgFill="1">
-        <p:nvSpPr>
-          <p:cNvPr id="9" name="Rectangle 8">
-            <a:extLst>
-              <a:ext uri="{FF2B5EF4-FFF2-40B4-BE49-F238E27FC236}">
-                <a16:creationId xmlns:a16="http://schemas.microsoft.com/office/drawing/2014/main" id="{BACC6370-2D7E-4714-9D71-7542949D7D5D}"/>
-              </a:ext>
-              <a:ext uri="{C183D7F6-B498-43B3-948B-1728B52AA6E4}">
-                <adec:decorative xmlns:adec="http://schemas.microsoft.com/office/drawing/2017/decorative" val="1"/>
-              </a:ext>
-            </a:extLst>
-          </p:cNvPr>
-          <p:cNvSpPr>
-            <a:spLocks noGrp="1" noRot="1" noChangeAspect="1" noMove="1" noResize="1" noEditPoints="1" noAdjustHandles="1" noChangeArrowheads="1" noChangeShapeType="1" noTextEdit="1"/>
-          </p:cNvSpPr>
-          <p:nvPr>
-            <p:extLst>
-              <p:ext uri="{386F3935-93C4-4BCD-93E2-E3B085C9AB24}">
-                <p16:designElem xmlns:p16="http://schemas.microsoft.com/office/powerpoint/2015/main" val="1"/>
-              </p:ext>
-            </p:extLst>
-          </p:nvPr>
-        </p:nvSpPr>
-        <p:spPr>
-          <a:xfrm>
-            <a:off x="0" y="0"/>
-            <a:ext cx="12192000" cy="6858000"/>
-          </a:xfrm>
-          <a:prstGeom prst="rect">
-            <a:avLst/>
-          </a:prstGeom>
-          <a:ln w="12700" cap="flat" cmpd="sng" algn="ctr">
-            <a:noFill/>
-            <a:prstDash val="solid"/>
-            <a:miter lim="800000"/>
-          </a:ln>
-          <a:effectLst/>
-          <a:extLst>
-            <a:ext uri="{91240B29-F687-4F45-9708-019B960494DF}">
-              <a14:hiddenLine xmlns:a14="http://schemas.microsoft.com/office/drawing/2010/main" w="12700" cap="flat" cmpd="sng" algn="ctr">
-                <a:solidFill>
-                  <a:schemeClr val="accent1">
-                    <a:shade val="50000"/>
-                  </a:schemeClr>
-                </a:solidFill>
-                <a:prstDash val="solid"/>
-                <a:miter lim="800000"/>
-              </a14:hiddenLine>
-            </a:ext>
-          </a:extLst>
-        </p:spPr>
-        <p:style>
-          <a:lnRef idx="2">
-            <a:schemeClr val="accent1">
-              <a:shade val="50000"/>
-            </a:schemeClr>
-          </a:lnRef>
-          <a:fillRef idx="1">
-            <a:schemeClr val="accent1"/>
-          </a:fillRef>
-          <a:effectRef idx="0">
-            <a:schemeClr val="accent1"/>
-          </a:effectRef>
-          <a:fontRef idx="minor">
-            <a:schemeClr val="lt1"/>
-          </a:fontRef>
-        </p:style>
-        <p:txBody>
-          <a:bodyPr rtlCol="0" anchor="ctr"/>
-          <a:lstStyle/>
-          <a:p>
-            <a:pPr algn="ctr"/>
-            <a:endParaRPr lang="en-US"/>
-          </a:p>
-        </p:txBody>
-      </p:sp>
-      <p:sp>
-        <p:nvSpPr>
-          <p:cNvPr id="11" name="Rectangle 10">
-            <a:extLst>
-              <a:ext uri="{FF2B5EF4-FFF2-40B4-BE49-F238E27FC236}">
-                <a16:creationId xmlns:a16="http://schemas.microsoft.com/office/drawing/2014/main" id="{F68B3F68-107C-434F-AA38-110D5EA91B85}"/>
-              </a:ext>
-              <a:ext uri="{C183D7F6-B498-43B3-948B-1728B52AA6E4}">
-                <adec:decorative xmlns:adec="http://schemas.microsoft.com/office/drawing/2017/decorative" val="1"/>
-              </a:ext>
-            </a:extLst>
-          </p:cNvPr>
-          <p:cNvSpPr>
-            <a:spLocks noGrp="1" noRot="1" noChangeAspect="1" noMove="1" noResize="1" noEditPoints="1" noAdjustHandles="1" noChangeArrowheads="1" noChangeShapeType="1" noTextEdit="1"/>
-          </p:cNvSpPr>
-          <p:nvPr>
-            <p:extLst>
-              <p:ext uri="{386F3935-93C4-4BCD-93E2-E3B085C9AB24}">
-                <p16:designElem xmlns:p16="http://schemas.microsoft.com/office/powerpoint/2015/main" val="1"/>
-              </p:ext>
-            </p:extLst>
-          </p:nvPr>
-        </p:nvSpPr>
-        <p:spPr>
-          <a:xfrm flipH="1">
-            <a:off x="2" y="0"/>
-            <a:ext cx="12191998" cy="1575955"/>
-          </a:xfrm>
-          <a:prstGeom prst="rect">
-            <a:avLst/>
-          </a:prstGeom>
-          <a:gradFill>
-            <a:gsLst>
-              <a:gs pos="0">
-                <a:srgbClr val="000000">
-                  <a:alpha val="96000"/>
-                </a:srgbClr>
-              </a:gs>
-              <a:gs pos="100000">
-                <a:schemeClr val="accent1">
-                  <a:lumMod val="75000"/>
-                </a:schemeClr>
-              </a:gs>
-            </a:gsLst>
-            <a:lin ang="8400000" scaled="0"/>
-          </a:gradFill>
-          <a:ln>
-            <a:noFill/>
-          </a:ln>
-        </p:spPr>
-        <p:style>
-          <a:lnRef idx="2">
-            <a:schemeClr val="accent1">
-              <a:shade val="50000"/>
-            </a:schemeClr>
-          </a:lnRef>
-          <a:fillRef idx="1">
-            <a:schemeClr val="accent1"/>
-          </a:fillRef>
-          <a:effectRef idx="0">
-            <a:schemeClr val="accent1"/>
-          </a:effectRef>
-          <a:fontRef idx="minor">
-            <a:schemeClr val="lt1"/>
-          </a:fontRef>
-        </p:style>
-        <p:txBody>
-          <a:bodyPr rtlCol="0" anchor="ctr"/>
-          <a:lstStyle/>
-          <a:p>
-            <a:pPr algn="ctr"/>
-            <a:endParaRPr lang="en-US"/>
-          </a:p>
-        </p:txBody>
-      </p:sp>
-      <p:sp>
-        <p:nvSpPr>
-          <p:cNvPr id="13" name="Rectangle 12">
-            <a:extLst>
-              <a:ext uri="{FF2B5EF4-FFF2-40B4-BE49-F238E27FC236}">
-                <a16:creationId xmlns:a16="http://schemas.microsoft.com/office/drawing/2014/main" id="{AAD0DBB9-1A4B-4391-81D4-CB19F9AB918A}"/>
-              </a:ext>
-              <a:ext uri="{C183D7F6-B498-43B3-948B-1728B52AA6E4}">
-                <adec:decorative xmlns:adec="http://schemas.microsoft.com/office/drawing/2017/decorative" val="1"/>
-              </a:ext>
-            </a:extLst>
-          </p:cNvPr>
-          <p:cNvSpPr>
-            <a:spLocks noGrp="1" noRot="1" noChangeAspect="1" noMove="1" noResize="1" noEditPoints="1" noAdjustHandles="1" noChangeArrowheads="1" noChangeShapeType="1" noTextEdit="1"/>
-          </p:cNvSpPr>
-          <p:nvPr>
-            <p:extLst>
-              <p:ext uri="{386F3935-93C4-4BCD-93E2-E3B085C9AB24}">
-                <p16:designElem xmlns:p16="http://schemas.microsoft.com/office/powerpoint/2015/main" val="1"/>
-              </p:ext>
-            </p:extLst>
-          </p:nvPr>
-        </p:nvSpPr>
-        <p:spPr>
-          <a:xfrm rot="10800000" flipH="1">
-            <a:off x="8128857" y="0"/>
-            <a:ext cx="4063143" cy="1576412"/>
-          </a:xfrm>
-          <a:prstGeom prst="rect">
-            <a:avLst/>
-          </a:prstGeom>
-          <a:gradFill>
-            <a:gsLst>
-              <a:gs pos="19000">
-                <a:schemeClr val="accent1">
-                  <a:lumMod val="50000"/>
-                  <a:alpha val="68000"/>
-                </a:schemeClr>
-              </a:gs>
-              <a:gs pos="100000">
-                <a:schemeClr val="accent1">
-                  <a:alpha val="79000"/>
-                </a:schemeClr>
-              </a:gs>
-            </a:gsLst>
-            <a:lin ang="19200000" scaled="0"/>
-          </a:gradFill>
-          <a:ln>
-            <a:noFill/>
-          </a:ln>
-        </p:spPr>
-        <p:style>
-          <a:lnRef idx="2">
-            <a:schemeClr val="accent1">
-              <a:shade val="50000"/>
-            </a:schemeClr>
-          </a:lnRef>
-          <a:fillRef idx="1">
-            <a:schemeClr val="accent1"/>
-          </a:fillRef>
-          <a:effectRef idx="0">
-            <a:schemeClr val="accent1"/>
-          </a:effectRef>
-          <a:fontRef idx="minor">
-            <a:schemeClr val="lt1"/>
-          </a:fontRef>
-        </p:style>
-        <p:txBody>
-          <a:bodyPr rtlCol="0" anchor="ctr"/>
-          <a:lstStyle/>
-          <a:p>
-            <a:pPr algn="ctr"/>
-            <a:endParaRPr lang="en-US"/>
-          </a:p>
-        </p:txBody>
-      </p:sp>
-      <p:sp>
-        <p:nvSpPr>
-          <p:cNvPr id="15" name="Rectangle 14">
-            <a:extLst>
-              <a:ext uri="{FF2B5EF4-FFF2-40B4-BE49-F238E27FC236}">
-                <a16:creationId xmlns:a16="http://schemas.microsoft.com/office/drawing/2014/main" id="{063BBA22-50EA-4C4D-BE05-F1CE4E63AA56}"/>
-              </a:ext>
-              <a:ext uri="{C183D7F6-B498-43B3-948B-1728B52AA6E4}">
-                <adec:decorative xmlns:adec="http://schemas.microsoft.com/office/drawing/2017/decorative" val="1"/>
-              </a:ext>
-            </a:extLst>
-          </p:cNvPr>
-          <p:cNvSpPr>
-            <a:spLocks noGrp="1" noRot="1" noChangeAspect="1" noMove="1" noResize="1" noEditPoints="1" noAdjustHandles="1" noChangeArrowheads="1" noChangeShapeType="1" noTextEdit="1"/>
-          </p:cNvSpPr>
-          <p:nvPr>
-            <p:extLst>
-              <p:ext uri="{386F3935-93C4-4BCD-93E2-E3B085C9AB24}">
-                <p16:designElem xmlns:p16="http://schemas.microsoft.com/office/powerpoint/2015/main" val="1"/>
-              </p:ext>
-            </p:extLst>
-          </p:nvPr>
-        </p:nvSpPr>
-        <p:spPr>
-          <a:xfrm rot="5400000">
-            <a:off x="5307777" y="-5307778"/>
-            <a:ext cx="1576446" cy="12192002"/>
-          </a:xfrm>
-          <a:prstGeom prst="rect">
-            <a:avLst/>
-          </a:prstGeom>
-          <a:gradFill>
-            <a:gsLst>
-              <a:gs pos="23000">
-                <a:schemeClr val="accent1">
-                  <a:alpha val="0"/>
-                </a:schemeClr>
-              </a:gs>
-              <a:gs pos="99000">
-                <a:srgbClr val="000000">
-                  <a:alpha val="74000"/>
-                </a:srgbClr>
-              </a:gs>
-            </a:gsLst>
-            <a:lin ang="20400000" scaled="0"/>
-          </a:gradFill>
-          <a:ln>
-            <a:noFill/>
-          </a:ln>
-        </p:spPr>
-        <p:style>
-          <a:lnRef idx="2">
-            <a:schemeClr val="accent1">
-              <a:shade val="50000"/>
-            </a:schemeClr>
-          </a:lnRef>
-          <a:fillRef idx="1">
-            <a:schemeClr val="accent1"/>
-          </a:fillRef>
-          <a:effectRef idx="0">
-            <a:schemeClr val="accent1"/>
-          </a:effectRef>
-          <a:fontRef idx="minor">
-            <a:schemeClr val="lt1"/>
-          </a:fontRef>
-        </p:style>
-        <p:txBody>
-          <a:bodyPr rtlCol="0" anchor="ctr"/>
-          <a:lstStyle/>
-          <a:p>
-            <a:pPr algn="ctr"/>
-            <a:endParaRPr lang="en-US" dirty="0"/>
-          </a:p>
-        </p:txBody>
-      </p:sp>
-      <p:sp>
-        <p:nvSpPr>
-          <p:cNvPr id="2" name="Título 1">
-            <a:extLst>
-              <a:ext uri="{FF2B5EF4-FFF2-40B4-BE49-F238E27FC236}">
-                <a16:creationId xmlns:a16="http://schemas.microsoft.com/office/drawing/2014/main" id="{F0292DAD-D95C-EBF9-78BC-92439399D3F3}"/>
-              </a:ext>
-            </a:extLst>
-          </p:cNvPr>
-          <p:cNvSpPr>
-            <a:spLocks noGrp="1"/>
-          </p:cNvSpPr>
-          <p:nvPr>
-            <p:ph type="title"/>
-          </p:nvPr>
-        </p:nvSpPr>
-        <p:spPr>
-          <a:xfrm>
-            <a:off x="1371597" y="348865"/>
-            <a:ext cx="10044023" cy="877729"/>
-          </a:xfrm>
-        </p:spPr>
-        <p:txBody>
-          <a:bodyPr anchor="ctr">
-            <a:normAutofit/>
-          </a:bodyPr>
-          <a:lstStyle/>
-          <a:p>
-            <a:r>
-              <a:rPr lang="es-MX" sz="4000" dirty="0">
-                <a:solidFill>
-                  <a:srgbClr val="FFFFFF"/>
-                </a:solidFill>
-              </a:rPr>
-              <a:t>Entorno y software requerido</a:t>
-            </a:r>
-          </a:p>
-        </p:txBody>
-      </p:sp>
-      <p:graphicFrame>
-        <p:nvGraphicFramePr>
-          <p:cNvPr id="5" name="Marcador de contenido 2">
-            <a:extLst>
-              <a:ext uri="{FF2B5EF4-FFF2-40B4-BE49-F238E27FC236}">
-                <a16:creationId xmlns:a16="http://schemas.microsoft.com/office/drawing/2014/main" id="{C5485C89-E65B-42F4-5C18-5B03EB649BB7}"/>
-              </a:ext>
-            </a:extLst>
-          </p:cNvPr>
-          <p:cNvGraphicFramePr>
-            <a:graphicFrameLocks noGrp="1"/>
-          </p:cNvGraphicFramePr>
-          <p:nvPr>
-            <p:ph idx="1"/>
-            <p:extLst>
-              <p:ext uri="{D42A27DB-BD31-4B8C-83A1-F6EECF244321}">
-                <p14:modId xmlns:p14="http://schemas.microsoft.com/office/powerpoint/2010/main" val="4267278157"/>
-              </p:ext>
-            </p:extLst>
-          </p:nvPr>
-        </p:nvGraphicFramePr>
-        <p:xfrm>
-          <a:off x="644056" y="2112579"/>
-          <a:ext cx="10927829" cy="4192805"/>
-        </p:xfrm>
-        <a:graphic>
-          <a:graphicData uri="http://schemas.openxmlformats.org/drawingml/2006/diagram">
-            <dgm:relIds xmlns:dgm="http://schemas.openxmlformats.org/drawingml/2006/diagram" xmlns:r="http://schemas.openxmlformats.org/officeDocument/2006/relationships" r:dm="rId2" r:lo="rId3" r:qs="rId4" r:cs="rId5"/>
-          </a:graphicData>
-        </a:graphic>
-      </p:graphicFrame>
-    </p:spTree>
-    <p:extLst>
-      <p:ext uri="{BB962C8B-B14F-4D97-AF65-F5344CB8AC3E}">
-        <p14:creationId xmlns:p14="http://schemas.microsoft.com/office/powerpoint/2010/main" val="3478704026"/>
       </p:ext>
     </p:extLst>
   </p:cSld>

</xml_diff>

<commit_message>
Mejora diseño del panel de administración y optimización de estilos en la tienda. Se agregaron nuevas secciones para pedidos y categorías, además de mejorar la visualización de productos en la tienda.
</commit_message>
<xml_diff>
--- a/AV Clean.pptx
+++ b/AV Clean.pptx
@@ -16,6 +16,7 @@
     <p:sldId id="262" r:id="rId10"/>
     <p:sldId id="263" r:id="rId11"/>
     <p:sldId id="266" r:id="rId12"/>
+    <p:sldId id="267" r:id="rId13"/>
   </p:sldIdLst>
   <p:sldSz cx="12192000" cy="6858000"/>
   <p:notesSz cx="6858000" cy="9144000"/>
@@ -12463,7 +12464,7 @@
           <a:p>
             <a:fld id="{1D45F402-2F27-478B-9A76-0BF697F18DB8}" type="datetimeFigureOut">
               <a:rPr lang="es-MX" smtClean="0"/>
-              <a:t>16/02/2026</a:t>
+              <a:t>18/02/2026</a:t>
             </a:fld>
             <a:endParaRPr lang="es-MX"/>
           </a:p>
@@ -12661,7 +12662,7 @@
           <a:p>
             <a:fld id="{1D45F402-2F27-478B-9A76-0BF697F18DB8}" type="datetimeFigureOut">
               <a:rPr lang="es-MX" smtClean="0"/>
-              <a:t>16/02/2026</a:t>
+              <a:t>18/02/2026</a:t>
             </a:fld>
             <a:endParaRPr lang="es-MX"/>
           </a:p>
@@ -12869,7 +12870,7 @@
           <a:p>
             <a:fld id="{1D45F402-2F27-478B-9A76-0BF697F18DB8}" type="datetimeFigureOut">
               <a:rPr lang="es-MX" smtClean="0"/>
-              <a:t>16/02/2026</a:t>
+              <a:t>18/02/2026</a:t>
             </a:fld>
             <a:endParaRPr lang="es-MX"/>
           </a:p>
@@ -13067,7 +13068,7 @@
           <a:p>
             <a:fld id="{1D45F402-2F27-478B-9A76-0BF697F18DB8}" type="datetimeFigureOut">
               <a:rPr lang="es-MX" smtClean="0"/>
-              <a:t>16/02/2026</a:t>
+              <a:t>18/02/2026</a:t>
             </a:fld>
             <a:endParaRPr lang="es-MX"/>
           </a:p>
@@ -13342,7 +13343,7 @@
           <a:p>
             <a:fld id="{1D45F402-2F27-478B-9A76-0BF697F18DB8}" type="datetimeFigureOut">
               <a:rPr lang="es-MX" smtClean="0"/>
-              <a:t>16/02/2026</a:t>
+              <a:t>18/02/2026</a:t>
             </a:fld>
             <a:endParaRPr lang="es-MX"/>
           </a:p>
@@ -13607,7 +13608,7 @@
           <a:p>
             <a:fld id="{1D45F402-2F27-478B-9A76-0BF697F18DB8}" type="datetimeFigureOut">
               <a:rPr lang="es-MX" smtClean="0"/>
-              <a:t>16/02/2026</a:t>
+              <a:t>18/02/2026</a:t>
             </a:fld>
             <a:endParaRPr lang="es-MX"/>
           </a:p>
@@ -14019,7 +14020,7 @@
           <a:p>
             <a:fld id="{1D45F402-2F27-478B-9A76-0BF697F18DB8}" type="datetimeFigureOut">
               <a:rPr lang="es-MX" smtClean="0"/>
-              <a:t>16/02/2026</a:t>
+              <a:t>18/02/2026</a:t>
             </a:fld>
             <a:endParaRPr lang="es-MX"/>
           </a:p>
@@ -14160,7 +14161,7 @@
           <a:p>
             <a:fld id="{1D45F402-2F27-478B-9A76-0BF697F18DB8}" type="datetimeFigureOut">
               <a:rPr lang="es-MX" smtClean="0"/>
-              <a:t>16/02/2026</a:t>
+              <a:t>18/02/2026</a:t>
             </a:fld>
             <a:endParaRPr lang="es-MX"/>
           </a:p>
@@ -14273,7 +14274,7 @@
           <a:p>
             <a:fld id="{1D45F402-2F27-478B-9A76-0BF697F18DB8}" type="datetimeFigureOut">
               <a:rPr lang="es-MX" smtClean="0"/>
-              <a:t>16/02/2026</a:t>
+              <a:t>18/02/2026</a:t>
             </a:fld>
             <a:endParaRPr lang="es-MX"/>
           </a:p>
@@ -14584,7 +14585,7 @@
           <a:p>
             <a:fld id="{1D45F402-2F27-478B-9A76-0BF697F18DB8}" type="datetimeFigureOut">
               <a:rPr lang="es-MX" smtClean="0"/>
-              <a:t>16/02/2026</a:t>
+              <a:t>18/02/2026</a:t>
             </a:fld>
             <a:endParaRPr lang="es-MX"/>
           </a:p>
@@ -14872,7 +14873,7 @@
           <a:p>
             <a:fld id="{1D45F402-2F27-478B-9A76-0BF697F18DB8}" type="datetimeFigureOut">
               <a:rPr lang="es-MX" smtClean="0"/>
-              <a:t>16/02/2026</a:t>
+              <a:t>18/02/2026</a:t>
             </a:fld>
             <a:endParaRPr lang="es-MX"/>
           </a:p>
@@ -15113,7 +15114,7 @@
           <a:p>
             <a:fld id="{1D45F402-2F27-478B-9A76-0BF697F18DB8}" type="datetimeFigureOut">
               <a:rPr lang="es-MX" smtClean="0"/>
-              <a:t>16/02/2026</a:t>
+              <a:t>18/02/2026</a:t>
             </a:fld>
             <a:endParaRPr lang="es-MX"/>
           </a:p>
@@ -16352,24 +16353,259 @@
               <a:t>sgonzalezm</a:t>
             </a:r>
             <a:r>
-              <a:rPr lang="es-MX"/>
+              <a:rPr lang="es-MX" dirty="0"/>
               <a:t> – 3lR10Quefluye$</a:t>
             </a:r>
           </a:p>
           <a:p>
             <a:pPr lvl="1"/>
-            <a:endParaRPr lang="es-MX"/>
+            <a:endParaRPr lang="es-MX" dirty="0"/>
           </a:p>
           <a:p>
             <a:pPr lvl="1"/>
             <a:endParaRPr lang="es-MX" dirty="0"/>
+          </a:p>
+        </p:txBody>
+      </p:sp>
+      <p:sp>
+        <p:nvSpPr>
+          <p:cNvPr id="6" name="Rectángulo 5">
+            <a:extLst>
+              <a:ext uri="{FF2B5EF4-FFF2-40B4-BE49-F238E27FC236}">
+                <a16:creationId xmlns:a16="http://schemas.microsoft.com/office/drawing/2014/main" id="{03B91529-9B8C-DEB2-683A-F6C47B7CDAE2}"/>
+              </a:ext>
+            </a:extLst>
+          </p:cNvPr>
+          <p:cNvSpPr/>
+          <p:nvPr/>
+        </p:nvSpPr>
+        <p:spPr>
+          <a:xfrm>
+            <a:off x="2662813" y="4200211"/>
+            <a:ext cx="8842550" cy="1225899"/>
+          </a:xfrm>
+          <a:prstGeom prst="rect">
+            <a:avLst/>
+          </a:prstGeom>
+        </p:spPr>
+        <p:style>
+          <a:lnRef idx="2">
+            <a:schemeClr val="accent1">
+              <a:shade val="15000"/>
+            </a:schemeClr>
+          </a:lnRef>
+          <a:fillRef idx="1">
+            <a:schemeClr val="accent1"/>
+          </a:fillRef>
+          <a:effectRef idx="0">
+            <a:schemeClr val="accent1"/>
+          </a:effectRef>
+          <a:fontRef idx="minor">
+            <a:schemeClr val="lt1"/>
+          </a:fontRef>
+        </p:style>
+        <p:txBody>
+          <a:bodyPr rtlCol="0" anchor="ctr"/>
+          <a:lstStyle/>
+          <a:p>
+            <a:pPr algn="ctr"/>
+            <a:endParaRPr lang="es-MX"/>
+          </a:p>
+        </p:txBody>
+      </p:sp>
+      <p:pic>
+        <p:nvPicPr>
+          <p:cNvPr id="8" name="Imagen 7">
+            <a:extLst>
+              <a:ext uri="{FF2B5EF4-FFF2-40B4-BE49-F238E27FC236}">
+                <a16:creationId xmlns:a16="http://schemas.microsoft.com/office/drawing/2014/main" id="{B0904AA3-0B5B-198E-23EF-6C7E096BF144}"/>
+              </a:ext>
+            </a:extLst>
+          </p:cNvPr>
+          <p:cNvPicPr>
+            <a:picLocks noChangeAspect="1"/>
+          </p:cNvPicPr>
+          <p:nvPr/>
+        </p:nvPicPr>
+        <p:blipFill>
+          <a:blip r:embed="rId2">
+            <a:extLst>
+              <a:ext uri="{28A0092B-C50C-407E-A947-70E740481C1C}">
+                <a14:useLocalDpi xmlns:a14="http://schemas.microsoft.com/office/drawing/2010/main" val="0"/>
+              </a:ext>
+            </a:extLst>
+          </a:blip>
+          <a:stretch>
+            <a:fillRect/>
+          </a:stretch>
+        </p:blipFill>
+        <p:spPr>
+          <a:xfrm>
+            <a:off x="4369636" y="2068332"/>
+            <a:ext cx="4766734" cy="4766734"/>
+          </a:xfrm>
+          <a:prstGeom prst="rect">
+            <a:avLst/>
+          </a:prstGeom>
+        </p:spPr>
+      </p:pic>
+    </p:spTree>
+    <p:extLst>
+      <p:ext uri="{BB962C8B-B14F-4D97-AF65-F5344CB8AC3E}">
+        <p14:creationId xmlns:p14="http://schemas.microsoft.com/office/powerpoint/2010/main" val="759370837"/>
+      </p:ext>
+    </p:extLst>
+  </p:cSld>
+  <p:clrMapOvr>
+    <a:masterClrMapping/>
+  </p:clrMapOvr>
+</p:sld>
+</file>
+
+<file path=ppt/slides/slide12.xml><?xml version="1.0" encoding="utf-8"?>
+<p:sld xmlns:a="http://schemas.openxmlformats.org/drawingml/2006/main" xmlns:r="http://schemas.openxmlformats.org/officeDocument/2006/relationships" xmlns:p="http://schemas.openxmlformats.org/presentationml/2006/main">
+  <p:cSld>
+    <p:spTree>
+      <p:nvGrpSpPr>
+        <p:cNvPr id="1" name=""/>
+        <p:cNvGrpSpPr/>
+        <p:nvPr/>
+      </p:nvGrpSpPr>
+      <p:grpSpPr>
+        <a:xfrm>
+          <a:off x="0" y="0"/>
+          <a:ext cx="0" cy="0"/>
+          <a:chOff x="0" y="0"/>
+          <a:chExt cx="0" cy="0"/>
+        </a:xfrm>
+      </p:grpSpPr>
+      <p:sp>
+        <p:nvSpPr>
+          <p:cNvPr id="2" name="Título 1">
+            <a:extLst>
+              <a:ext uri="{FF2B5EF4-FFF2-40B4-BE49-F238E27FC236}">
+                <a16:creationId xmlns:a16="http://schemas.microsoft.com/office/drawing/2014/main" id="{41451902-533D-A64C-D443-B7B846CFDB67}"/>
+              </a:ext>
+            </a:extLst>
+          </p:cNvPr>
+          <p:cNvSpPr>
+            <a:spLocks noGrp="1"/>
+          </p:cNvSpPr>
+          <p:nvPr>
+            <p:ph type="title"/>
+          </p:nvPr>
+        </p:nvSpPr>
+        <p:spPr/>
+        <p:txBody>
+          <a:bodyPr/>
+          <a:lstStyle/>
+          <a:p>
+            <a:r>
+              <a:rPr lang="es-MX" dirty="0"/>
+              <a:t>Productos</a:t>
+            </a:r>
+          </a:p>
+        </p:txBody>
+      </p:sp>
+      <p:sp>
+        <p:nvSpPr>
+          <p:cNvPr id="3" name="Marcador de contenido 2">
+            <a:extLst>
+              <a:ext uri="{FF2B5EF4-FFF2-40B4-BE49-F238E27FC236}">
+                <a16:creationId xmlns:a16="http://schemas.microsoft.com/office/drawing/2014/main" id="{9436BEA6-CC87-4A05-06D7-C79FB59042BA}"/>
+              </a:ext>
+            </a:extLst>
+          </p:cNvPr>
+          <p:cNvSpPr>
+            <a:spLocks noGrp="1"/>
+          </p:cNvSpPr>
+          <p:nvPr>
+            <p:ph idx="1"/>
+          </p:nvPr>
+        </p:nvSpPr>
+        <p:spPr>
+          <a:xfrm>
+            <a:off x="838200" y="1825625"/>
+            <a:ext cx="5827776" cy="4351338"/>
+          </a:xfrm>
+        </p:spPr>
+        <p:txBody>
+          <a:bodyPr>
+            <a:normAutofit fontScale="85000" lnSpcReduction="20000"/>
+          </a:bodyPr>
+          <a:lstStyle/>
+          <a:p>
+            <a:r>
+              <a:rPr lang="es-MX" dirty="0"/>
+              <a:t>Desengrasante cocina industrial </a:t>
+            </a:r>
+          </a:p>
+          <a:p>
+            <a:r>
+              <a:rPr lang="es-MX" dirty="0"/>
+              <a:t>Cloro</a:t>
+            </a:r>
+          </a:p>
+          <a:p>
+            <a:r>
+              <a:rPr lang="es-MX" dirty="0"/>
+              <a:t>Pinol</a:t>
+            </a:r>
+          </a:p>
+          <a:p>
+            <a:r>
+              <a:rPr lang="es-MX" dirty="0"/>
+              <a:t>Suavizantes (2 aromas)</a:t>
+            </a:r>
+          </a:p>
+          <a:p>
+            <a:r>
+              <a:rPr lang="es-MX" dirty="0"/>
+              <a:t>Limpiador tipo Fabuloso (4 aromas)</a:t>
+            </a:r>
+          </a:p>
+          <a:p>
+            <a:r>
+              <a:rPr lang="es-MX" dirty="0"/>
+              <a:t>Quita cochambre</a:t>
+            </a:r>
+          </a:p>
+          <a:p>
+            <a:r>
+              <a:rPr lang="es-MX" dirty="0"/>
+              <a:t>Mas color</a:t>
+            </a:r>
+          </a:p>
+          <a:p>
+            <a:r>
+              <a:rPr lang="es-MX" dirty="0"/>
+              <a:t>Mas color ropa negra</a:t>
+            </a:r>
+          </a:p>
+          <a:p>
+            <a:r>
+              <a:rPr lang="es-MX" dirty="0"/>
+              <a:t>Detergente ropa blanca</a:t>
+            </a:r>
+          </a:p>
+          <a:p>
+            <a:r>
+              <a:rPr lang="es-MX" dirty="0"/>
+              <a:t>Jabón liquido para manos</a:t>
+            </a:r>
+          </a:p>
+          <a:p>
+            <a:r>
+              <a:rPr lang="es-MX" dirty="0"/>
+              <a:t>Jabón liquido trastes</a:t>
+            </a:r>
           </a:p>
         </p:txBody>
       </p:sp>
     </p:spTree>
     <p:extLst>
       <p:ext uri="{BB962C8B-B14F-4D97-AF65-F5344CB8AC3E}">
-        <p14:creationId xmlns:p14="http://schemas.microsoft.com/office/powerpoint/2010/main" val="759370837"/>
+        <p14:creationId xmlns:p14="http://schemas.microsoft.com/office/powerpoint/2010/main" val="299295445"/>
       </p:ext>
     </p:extLst>
   </p:cSld>

</xml_diff>